<commit_message>
Final materials for Day 2
</commit_message>
<xml_diff>
--- a/Slides/0 - ORM Intro.pptx
+++ b/Slides/0 - ORM Intro.pptx
@@ -5,16 +5,17 @@
     <p:sldMasterId id="2147483660" r:id="rId1"/>
   </p:sldMasterIdLst>
   <p:sldIdLst>
-    <p:sldId id="256" r:id="rId2"/>
+    <p:sldId id="266" r:id="rId2"/>
     <p:sldId id="258" r:id="rId3"/>
-    <p:sldId id="262" r:id="rId4"/>
-    <p:sldId id="257" r:id="rId5"/>
-    <p:sldId id="259" r:id="rId6"/>
-    <p:sldId id="260" r:id="rId7"/>
-    <p:sldId id="263" r:id="rId8"/>
-    <p:sldId id="264" r:id="rId9"/>
-    <p:sldId id="261" r:id="rId10"/>
-    <p:sldId id="265" r:id="rId11"/>
+    <p:sldId id="267" r:id="rId4"/>
+    <p:sldId id="262" r:id="rId5"/>
+    <p:sldId id="257" r:id="rId6"/>
+    <p:sldId id="259" r:id="rId7"/>
+    <p:sldId id="260" r:id="rId8"/>
+    <p:sldId id="263" r:id="rId9"/>
+    <p:sldId id="264" r:id="rId10"/>
+    <p:sldId id="261" r:id="rId11"/>
+    <p:sldId id="265" r:id="rId12"/>
   </p:sldIdLst>
   <p:sldSz cx="9144000" cy="6858000" type="screen4x3"/>
   <p:notesSz cx="6858000" cy="9144000"/>
@@ -113,6 +114,11 @@
       </a:defRPr>
     </a:lvl9pPr>
   </p:defaultTextStyle>
+  <p:extLst>
+    <p:ext uri="{EFAFB233-063F-42B5-8137-9DF3F51BA10A}">
+      <p15:sldGuideLst xmlns:p15="http://schemas.microsoft.com/office/powerpoint/2012/main"/>
+    </p:ext>
+  </p:extLst>
 </p:presentation>
 </file>
 
@@ -247,7 +253,7 @@
           <a:p>
             <a:fld id="{FA8255EA-79F7-48B6-8503-362178FB802C}" type="datetimeFigureOut">
               <a:rPr lang="en-US" smtClean="0"/>
-              <a:t>2/2/2015</a:t>
+              <a:t>2/3/2015</a:t>
             </a:fld>
             <a:endParaRPr lang="en-US"/>
           </a:p>
@@ -417,7 +423,7 @@
           <a:p>
             <a:fld id="{FA8255EA-79F7-48B6-8503-362178FB802C}" type="datetimeFigureOut">
               <a:rPr lang="en-US" smtClean="0"/>
-              <a:t>2/2/2015</a:t>
+              <a:t>2/3/2015</a:t>
             </a:fld>
             <a:endParaRPr lang="en-US"/>
           </a:p>
@@ -597,7 +603,7 @@
           <a:p>
             <a:fld id="{FA8255EA-79F7-48B6-8503-362178FB802C}" type="datetimeFigureOut">
               <a:rPr lang="en-US" smtClean="0"/>
-              <a:t>2/2/2015</a:t>
+              <a:t>2/3/2015</a:t>
             </a:fld>
             <a:endParaRPr lang="en-US"/>
           </a:p>
@@ -767,7 +773,7 @@
           <a:p>
             <a:fld id="{FA8255EA-79F7-48B6-8503-362178FB802C}" type="datetimeFigureOut">
               <a:rPr lang="en-US" smtClean="0"/>
-              <a:t>2/2/2015</a:t>
+              <a:t>2/3/2015</a:t>
             </a:fld>
             <a:endParaRPr lang="en-US"/>
           </a:p>
@@ -1011,7 +1017,7 @@
           <a:p>
             <a:fld id="{FA8255EA-79F7-48B6-8503-362178FB802C}" type="datetimeFigureOut">
               <a:rPr lang="en-US" smtClean="0"/>
-              <a:t>2/2/2015</a:t>
+              <a:t>2/3/2015</a:t>
             </a:fld>
             <a:endParaRPr lang="en-US"/>
           </a:p>
@@ -1243,7 +1249,7 @@
           <a:p>
             <a:fld id="{FA8255EA-79F7-48B6-8503-362178FB802C}" type="datetimeFigureOut">
               <a:rPr lang="en-US" smtClean="0"/>
-              <a:t>2/2/2015</a:t>
+              <a:t>2/3/2015</a:t>
             </a:fld>
             <a:endParaRPr lang="en-US"/>
           </a:p>
@@ -1610,7 +1616,7 @@
           <a:p>
             <a:fld id="{FA8255EA-79F7-48B6-8503-362178FB802C}" type="datetimeFigureOut">
               <a:rPr lang="en-US" smtClean="0"/>
-              <a:t>2/2/2015</a:t>
+              <a:t>2/3/2015</a:t>
             </a:fld>
             <a:endParaRPr lang="en-US"/>
           </a:p>
@@ -1728,7 +1734,7 @@
           <a:p>
             <a:fld id="{FA8255EA-79F7-48B6-8503-362178FB802C}" type="datetimeFigureOut">
               <a:rPr lang="en-US" smtClean="0"/>
-              <a:t>2/2/2015</a:t>
+              <a:t>2/3/2015</a:t>
             </a:fld>
             <a:endParaRPr lang="en-US"/>
           </a:p>
@@ -1823,7 +1829,7 @@
           <a:p>
             <a:fld id="{FA8255EA-79F7-48B6-8503-362178FB802C}" type="datetimeFigureOut">
               <a:rPr lang="en-US" smtClean="0"/>
-              <a:t>2/2/2015</a:t>
+              <a:t>2/3/2015</a:t>
             </a:fld>
             <a:endParaRPr lang="en-US"/>
           </a:p>
@@ -2100,7 +2106,7 @@
           <a:p>
             <a:fld id="{FA8255EA-79F7-48B6-8503-362178FB802C}" type="datetimeFigureOut">
               <a:rPr lang="en-US" smtClean="0"/>
-              <a:t>2/2/2015</a:t>
+              <a:t>2/3/2015</a:t>
             </a:fld>
             <a:endParaRPr lang="en-US"/>
           </a:p>
@@ -2357,7 +2363,7 @@
           <a:p>
             <a:fld id="{FA8255EA-79F7-48B6-8503-362178FB802C}" type="datetimeFigureOut">
               <a:rPr lang="en-US" smtClean="0"/>
-              <a:t>2/2/2015</a:t>
+              <a:t>2/3/2015</a:t>
             </a:fld>
             <a:endParaRPr lang="en-US"/>
           </a:p>
@@ -2570,7 +2576,7 @@
           <a:p>
             <a:fld id="{FA8255EA-79F7-48B6-8503-362178FB802C}" type="datetimeFigureOut">
               <a:rPr lang="en-US" smtClean="0"/>
-              <a:t>2/2/2015</a:t>
+              <a:t>2/3/2015</a:t>
             </a:fld>
             <a:endParaRPr lang="en-US"/>
           </a:p>
@@ -2992,7 +2998,7 @@
           <a:p>
             <a:r>
               <a:rPr lang="en-US" dirty="0" smtClean="0"/>
-              <a:t>ORM’s</a:t>
+              <a:t>NHibernate and EF</a:t>
             </a:r>
             <a:endParaRPr lang="en-US" dirty="0"/>
           </a:p>
@@ -3013,14 +3019,170 @@
           <a:bodyPr/>
           <a:lstStyle/>
           <a:p>
-            <a:endParaRPr lang="en-US"/>
-          </a:p>
-        </p:txBody>
-      </p:sp>
+            <a:r>
+              <a:rPr lang="en-US" dirty="0" smtClean="0"/>
+              <a:t>Overview of Day 2</a:t>
+            </a:r>
+            <a:endParaRPr lang="en-US" dirty="0"/>
+          </a:p>
+        </p:txBody>
+      </p:sp>
+      <p:pic>
+        <p:nvPicPr>
+          <p:cNvPr id="21" name="Picture 20"/>
+          <p:cNvPicPr>
+            <a:picLocks noChangeAspect="1"/>
+          </p:cNvPicPr>
+          <p:nvPr/>
+        </p:nvPicPr>
+        <p:blipFill>
+          <a:blip r:embed="rId2"/>
+          <a:stretch>
+            <a:fillRect/>
+          </a:stretch>
+        </p:blipFill>
+        <p:spPr>
+          <a:xfrm>
+            <a:off x="3857870" y="4619625"/>
+            <a:ext cx="5138492" cy="2238375"/>
+          </a:xfrm>
+          <a:prstGeom prst="rect">
+            <a:avLst/>
+          </a:prstGeom>
+        </p:spPr>
+      </p:pic>
     </p:spTree>
     <p:extLst>
       <p:ext uri="{BB962C8B-B14F-4D97-AF65-F5344CB8AC3E}">
-        <p14:creationId xmlns:p14="http://schemas.microsoft.com/office/powerpoint/2010/main" val="1138723270"/>
+        <p14:creationId xmlns:p14="http://schemas.microsoft.com/office/powerpoint/2010/main" val="3038412551"/>
+      </p:ext>
+    </p:extLst>
+  </p:cSld>
+  <p:clrMapOvr>
+    <a:masterClrMapping/>
+  </p:clrMapOvr>
+  <p:timing>
+    <p:tnLst>
+      <p:par>
+        <p:cTn id="1" dur="indefinite" restart="never" nodeType="tmRoot"/>
+      </p:par>
+    </p:tnLst>
+  </p:timing>
+</p:sld>
+</file>
+
+<file path=ppt/slides/slide10.xml><?xml version="1.0" encoding="utf-8"?>
+<p:sld xmlns:a="http://schemas.openxmlformats.org/drawingml/2006/main" xmlns:r="http://schemas.openxmlformats.org/officeDocument/2006/relationships" xmlns:p="http://schemas.openxmlformats.org/presentationml/2006/main">
+  <p:cSld>
+    <p:spTree>
+      <p:nvGrpSpPr>
+        <p:cNvPr id="1" name=""/>
+        <p:cNvGrpSpPr/>
+        <p:nvPr/>
+      </p:nvGrpSpPr>
+      <p:grpSpPr>
+        <a:xfrm>
+          <a:off x="0" y="0"/>
+          <a:ext cx="0" cy="0"/>
+          <a:chOff x="0" y="0"/>
+          <a:chExt cx="0" cy="0"/>
+        </a:xfrm>
+      </p:grpSpPr>
+      <p:sp>
+        <p:nvSpPr>
+          <p:cNvPr id="2" name="Title 1"/>
+          <p:cNvSpPr>
+            <a:spLocks noGrp="1"/>
+          </p:cNvSpPr>
+          <p:nvPr>
+            <p:ph type="title"/>
+          </p:nvPr>
+        </p:nvSpPr>
+        <p:spPr/>
+        <p:txBody>
+          <a:bodyPr/>
+          <a:lstStyle/>
+          <a:p>
+            <a:r>
+              <a:rPr lang="en-US" dirty="0" smtClean="0"/>
+              <a:t>What we will examine in each</a:t>
+            </a:r>
+            <a:endParaRPr lang="en-US" dirty="0"/>
+          </a:p>
+        </p:txBody>
+      </p:sp>
+      <p:sp>
+        <p:nvSpPr>
+          <p:cNvPr id="3" name="Content Placeholder 2"/>
+          <p:cNvSpPr>
+            <a:spLocks noGrp="1"/>
+          </p:cNvSpPr>
+          <p:nvPr>
+            <p:ph idx="1"/>
+          </p:nvPr>
+        </p:nvSpPr>
+        <p:spPr>
+          <a:xfrm>
+            <a:off x="628650" y="1825625"/>
+            <a:ext cx="7886700" cy="3306212"/>
+          </a:xfrm>
+        </p:spPr>
+        <p:txBody>
+          <a:bodyPr>
+            <a:normAutofit lnSpcReduction="10000"/>
+          </a:bodyPr>
+          <a:lstStyle/>
+          <a:p>
+            <a:r>
+              <a:rPr lang="en-US" dirty="0" smtClean="0"/>
+              <a:t>Some history and theory</a:t>
+            </a:r>
+          </a:p>
+          <a:p>
+            <a:r>
+              <a:rPr lang="en-US" dirty="0" smtClean="0"/>
+              <a:t>Primarily database-first</a:t>
+            </a:r>
+          </a:p>
+          <a:p>
+            <a:r>
+              <a:rPr lang="en-US" dirty="0" smtClean="0"/>
+              <a:t>How code-first can be used to create a database</a:t>
+            </a:r>
+          </a:p>
+          <a:p>
+            <a:r>
+              <a:rPr lang="en-US" dirty="0" smtClean="0"/>
+              <a:t>How to map basic entities into database constructs</a:t>
+            </a:r>
+          </a:p>
+          <a:p>
+            <a:r>
+              <a:rPr lang="en-US" dirty="0" smtClean="0"/>
+              <a:t>CRUD operations on classes</a:t>
+            </a:r>
+          </a:p>
+          <a:p>
+            <a:r>
+              <a:rPr lang="en-US" dirty="0" smtClean="0"/>
+              <a:t>Navigating relationships</a:t>
+            </a:r>
+          </a:p>
+          <a:p>
+            <a:r>
+              <a:rPr lang="en-US" dirty="0" smtClean="0"/>
+              <a:t>Lazy and eager loading</a:t>
+            </a:r>
+          </a:p>
+          <a:p>
+            <a:endParaRPr lang="en-US" dirty="0"/>
+          </a:p>
+        </p:txBody>
+      </p:sp>
+    </p:spTree>
+    <p:extLst>
+      <p:ext uri="{BB962C8B-B14F-4D97-AF65-F5344CB8AC3E}">
+        <p14:creationId xmlns:p14="http://schemas.microsoft.com/office/powerpoint/2010/main" val="2626820673"/>
       </p:ext>
     </p:extLst>
   </p:cSld>
@@ -3030,7 +3192,7 @@
 </p:sld>
 </file>
 
-<file path=ppt/slides/slide10.xml><?xml version="1.0" encoding="utf-8"?>
+<file path=ppt/slides/slide11.xml><?xml version="1.0" encoding="utf-8"?>
 <p:sld xmlns:a="http://schemas.openxmlformats.org/drawingml/2006/main" xmlns:r="http://schemas.openxmlformats.org/officeDocument/2006/relationships" xmlns:p="http://schemas.openxmlformats.org/presentationml/2006/main">
   <p:cSld>
     <p:spTree>
@@ -4204,6 +4366,188 @@
           <a:p>
             <a:r>
               <a:rPr lang="en-US" dirty="0" smtClean="0"/>
+              <a:t>ORM Advantages</a:t>
+            </a:r>
+            <a:endParaRPr lang="bg-BG" dirty="0"/>
+          </a:p>
+        </p:txBody>
+      </p:sp>
+      <p:sp>
+        <p:nvSpPr>
+          <p:cNvPr id="3" name="Content Placeholder 2"/>
+          <p:cNvSpPr>
+            <a:spLocks noGrp="1"/>
+          </p:cNvSpPr>
+          <p:nvPr>
+            <p:ph idx="1"/>
+          </p:nvPr>
+        </p:nvSpPr>
+        <p:spPr/>
+        <p:txBody>
+          <a:bodyPr/>
+          <a:lstStyle/>
+          <a:p>
+            <a:pPr>
+              <a:lnSpc>
+                <a:spcPct val="100000"/>
+              </a:lnSpc>
+            </a:pPr>
+            <a:r>
+              <a:rPr lang="en-US" dirty="0" smtClean="0"/>
+              <a:t>Object-relational mapping advantages</a:t>
+            </a:r>
+          </a:p>
+          <a:p>
+            <a:pPr lvl="1">
+              <a:lnSpc>
+                <a:spcPct val="100000"/>
+              </a:lnSpc>
+            </a:pPr>
+            <a:r>
+              <a:rPr lang="en-US" dirty="0" smtClean="0"/>
+              <a:t>Developer productivity</a:t>
+            </a:r>
+          </a:p>
+          <a:p>
+            <a:pPr lvl="2">
+              <a:lnSpc>
+                <a:spcPct val="100000"/>
+              </a:lnSpc>
+            </a:pPr>
+            <a:r>
+              <a:rPr lang="en-US" dirty="0" smtClean="0"/>
+              <a:t>Writing less code</a:t>
+            </a:r>
+          </a:p>
+          <a:p>
+            <a:pPr lvl="1">
+              <a:lnSpc>
+                <a:spcPct val="100000"/>
+              </a:lnSpc>
+            </a:pPr>
+            <a:r>
+              <a:rPr lang="da-DK" dirty="0" smtClean="0"/>
+              <a:t>Abstract from differences between object and relational world</a:t>
+            </a:r>
+          </a:p>
+          <a:p>
+            <a:pPr lvl="2">
+              <a:lnSpc>
+                <a:spcPct val="100000"/>
+              </a:lnSpc>
+            </a:pPr>
+            <a:r>
+              <a:rPr lang="da-DK" dirty="0" smtClean="0"/>
+              <a:t>Complexity hidden within ORM</a:t>
+            </a:r>
+          </a:p>
+          <a:p>
+            <a:pPr lvl="1">
+              <a:lnSpc>
+                <a:spcPct val="100000"/>
+              </a:lnSpc>
+            </a:pPr>
+            <a:r>
+              <a:rPr lang="en-US" dirty="0" smtClean="0"/>
+              <a:t>Manageability of the CRUD operations for complex relationships</a:t>
+            </a:r>
+          </a:p>
+          <a:p>
+            <a:pPr lvl="1">
+              <a:lnSpc>
+                <a:spcPct val="100000"/>
+              </a:lnSpc>
+            </a:pPr>
+            <a:r>
+              <a:rPr lang="en-US" dirty="0" smtClean="0"/>
+              <a:t>Easier maintainability</a:t>
+            </a:r>
+          </a:p>
+        </p:txBody>
+      </p:sp>
+      <p:sp>
+        <p:nvSpPr>
+          <p:cNvPr id="4" name="Slide Number Placeholder 3"/>
+          <p:cNvSpPr>
+            <a:spLocks noGrp="1"/>
+          </p:cNvSpPr>
+          <p:nvPr>
+            <p:ph type="sldNum" sz="quarter" idx="10"/>
+          </p:nvPr>
+        </p:nvSpPr>
+        <p:spPr/>
+        <p:txBody>
+          <a:bodyPr/>
+          <a:lstStyle/>
+          <a:p>
+            <a:pPr>
+              <a:defRPr/>
+            </a:pPr>
+            <a:fld id="{58452FF4-89E3-4D1B-9927-2DBDC00E58D7}" type="slidenum">
+              <a:rPr lang="en-US" smtClean="0"/>
+              <a:pPr>
+                <a:defRPr/>
+              </a:pPr>
+              <a:t>3</a:t>
+            </a:fld>
+            <a:endParaRPr lang="en-US" dirty="0"/>
+          </a:p>
+        </p:txBody>
+      </p:sp>
+    </p:spTree>
+    <p:extLst>
+      <p:ext uri="{BB962C8B-B14F-4D97-AF65-F5344CB8AC3E}">
+        <p14:creationId xmlns:p14="http://schemas.microsoft.com/office/powerpoint/2010/main" val="3811221404"/>
+      </p:ext>
+    </p:extLst>
+  </p:cSld>
+  <p:clrMapOvr>
+    <a:masterClrMapping/>
+  </p:clrMapOvr>
+  <p:timing>
+    <p:tnLst>
+      <p:par>
+        <p:cTn id="1" dur="indefinite" restart="never" nodeType="tmRoot"/>
+      </p:par>
+    </p:tnLst>
+  </p:timing>
+</p:sld>
+</file>
+
+<file path=ppt/slides/slide4.xml><?xml version="1.0" encoding="utf-8"?>
+<p:sld xmlns:a="http://schemas.openxmlformats.org/drawingml/2006/main" xmlns:r="http://schemas.openxmlformats.org/officeDocument/2006/relationships" xmlns:p="http://schemas.openxmlformats.org/presentationml/2006/main">
+  <p:cSld>
+    <p:spTree>
+      <p:nvGrpSpPr>
+        <p:cNvPr id="1" name=""/>
+        <p:cNvGrpSpPr/>
+        <p:nvPr/>
+      </p:nvGrpSpPr>
+      <p:grpSpPr>
+        <a:xfrm>
+          <a:off x="0" y="0"/>
+          <a:ext cx="0" cy="0"/>
+          <a:chOff x="0" y="0"/>
+          <a:chExt cx="0" cy="0"/>
+        </a:xfrm>
+      </p:grpSpPr>
+      <p:sp>
+        <p:nvSpPr>
+          <p:cNvPr id="2" name="Title 1"/>
+          <p:cNvSpPr>
+            <a:spLocks noGrp="1"/>
+          </p:cNvSpPr>
+          <p:nvPr>
+            <p:ph type="title"/>
+          </p:nvPr>
+        </p:nvSpPr>
+        <p:spPr/>
+        <p:txBody>
+          <a:bodyPr/>
+          <a:lstStyle/>
+          <a:p>
+            <a:r>
+              <a:rPr lang="en-US" dirty="0" smtClean="0"/>
               <a:t>Primary issues an ORM deals with</a:t>
             </a:r>
             <a:endParaRPr lang="en-US" dirty="0"/>
@@ -4276,7 +4620,7 @@
 </p:sld>
 </file>
 
-<file path=ppt/slides/slide4.xml><?xml version="1.0" encoding="utf-8"?>
+<file path=ppt/slides/slide5.xml><?xml version="1.0" encoding="utf-8"?>
 <p:sld xmlns:a="http://schemas.openxmlformats.org/drawingml/2006/main" xmlns:r="http://schemas.openxmlformats.org/officeDocument/2006/relationships" xmlns:p="http://schemas.openxmlformats.org/presentationml/2006/main">
   <p:cSld>
     <p:spTree>
@@ -4367,7 +4711,7 @@
 </p:sld>
 </file>
 
-<file path=ppt/slides/slide5.xml><?xml version="1.0" encoding="utf-8"?>
+<file path=ppt/slides/slide6.xml><?xml version="1.0" encoding="utf-8"?>
 <p:sld xmlns:a="http://schemas.openxmlformats.org/drawingml/2006/main" xmlns:r="http://schemas.openxmlformats.org/officeDocument/2006/relationships" xmlns:p="http://schemas.openxmlformats.org/presentationml/2006/main">
   <p:cSld>
     <p:spTree>
@@ -4637,100 +4981,13 @@
   <p:clrMapOvr>
     <a:masterClrMapping/>
   </p:clrMapOvr>
-</p:sld>
-</file>
-
-<file path=ppt/slides/slide6.xml><?xml version="1.0" encoding="utf-8"?>
-<p:sld xmlns:a="http://schemas.openxmlformats.org/drawingml/2006/main" xmlns:r="http://schemas.openxmlformats.org/officeDocument/2006/relationships" xmlns:p="http://schemas.openxmlformats.org/presentationml/2006/main">
-  <p:cSld>
-    <p:spTree>
-      <p:nvGrpSpPr>
-        <p:cNvPr id="1" name=""/>
-        <p:cNvGrpSpPr/>
-        <p:nvPr/>
-      </p:nvGrpSpPr>
-      <p:grpSpPr>
-        <a:xfrm>
-          <a:off x="0" y="0"/>
-          <a:ext cx="0" cy="0"/>
-          <a:chOff x="0" y="0"/>
-          <a:chExt cx="0" cy="0"/>
-        </a:xfrm>
-      </p:grpSpPr>
-      <p:sp>
-        <p:nvSpPr>
-          <p:cNvPr id="2" name="Title 1"/>
-          <p:cNvSpPr>
-            <a:spLocks noGrp="1"/>
-          </p:cNvSpPr>
-          <p:nvPr>
-            <p:ph type="title"/>
-          </p:nvPr>
-        </p:nvSpPr>
-        <p:spPr/>
-        <p:txBody>
-          <a:bodyPr/>
-          <a:lstStyle/>
-          <a:p>
-            <a:r>
-              <a:rPr lang="en-US" dirty="0" smtClean="0"/>
-              <a:t>.NET ORM’s</a:t>
-            </a:r>
-            <a:endParaRPr lang="en-US" dirty="0"/>
-          </a:p>
-        </p:txBody>
-      </p:sp>
-      <p:sp>
-        <p:nvSpPr>
-          <p:cNvPr id="3" name="Content Placeholder 2"/>
-          <p:cNvSpPr>
-            <a:spLocks noGrp="1"/>
-          </p:cNvSpPr>
-          <p:nvPr>
-            <p:ph idx="1"/>
-          </p:nvPr>
-        </p:nvSpPr>
-        <p:spPr/>
-        <p:txBody>
-          <a:bodyPr/>
-          <a:lstStyle/>
-          <a:p>
-            <a:r>
-              <a:rPr lang="en-US" dirty="0" smtClean="0"/>
-              <a:t>Entity Framework</a:t>
-            </a:r>
-          </a:p>
-          <a:p>
-            <a:r>
-              <a:rPr lang="en-US" dirty="0" smtClean="0"/>
-              <a:t>NHibernate</a:t>
-            </a:r>
-          </a:p>
-          <a:p>
-            <a:r>
-              <a:rPr lang="en-US" dirty="0" smtClean="0"/>
-              <a:t>LINQ to SQL</a:t>
-            </a:r>
-          </a:p>
-          <a:p>
-            <a:r>
-              <a:rPr lang="en-US" dirty="0" smtClean="0"/>
-              <a:t>Subsonic</a:t>
-            </a:r>
-            <a:endParaRPr lang="en-US" dirty="0"/>
-          </a:p>
-        </p:txBody>
-      </p:sp>
-    </p:spTree>
-    <p:extLst>
-      <p:ext uri="{BB962C8B-B14F-4D97-AF65-F5344CB8AC3E}">
-        <p14:creationId xmlns:p14="http://schemas.microsoft.com/office/powerpoint/2010/main" val="4068707299"/>
-      </p:ext>
-    </p:extLst>
-  </p:cSld>
-  <p:clrMapOvr>
-    <a:masterClrMapping/>
-  </p:clrMapOvr>
+  <p:timing>
+    <p:tnLst>
+      <p:par>
+        <p:cTn id="1" dur="indefinite" restart="never" nodeType="tmRoot"/>
+      </p:par>
+    </p:tnLst>
+  </p:timing>
 </p:sld>
 </file>
 
@@ -4768,6 +5025,100 @@
           <a:p>
             <a:r>
               <a:rPr lang="en-US" dirty="0" smtClean="0"/>
+              <a:t>.NET ORM’s</a:t>
+            </a:r>
+            <a:endParaRPr lang="en-US" dirty="0"/>
+          </a:p>
+        </p:txBody>
+      </p:sp>
+      <p:sp>
+        <p:nvSpPr>
+          <p:cNvPr id="3" name="Content Placeholder 2"/>
+          <p:cNvSpPr>
+            <a:spLocks noGrp="1"/>
+          </p:cNvSpPr>
+          <p:nvPr>
+            <p:ph idx="1"/>
+          </p:nvPr>
+        </p:nvSpPr>
+        <p:spPr/>
+        <p:txBody>
+          <a:bodyPr/>
+          <a:lstStyle/>
+          <a:p>
+            <a:r>
+              <a:rPr lang="en-US" dirty="0" smtClean="0"/>
+              <a:t>Entity Framework</a:t>
+            </a:r>
+          </a:p>
+          <a:p>
+            <a:r>
+              <a:rPr lang="en-US" dirty="0" smtClean="0"/>
+              <a:t>NHibernate</a:t>
+            </a:r>
+          </a:p>
+          <a:p>
+            <a:r>
+              <a:rPr lang="en-US" dirty="0" smtClean="0"/>
+              <a:t>LINQ to SQL</a:t>
+            </a:r>
+          </a:p>
+          <a:p>
+            <a:r>
+              <a:rPr lang="en-US" dirty="0" smtClean="0"/>
+              <a:t>Subsonic</a:t>
+            </a:r>
+            <a:endParaRPr lang="en-US" dirty="0"/>
+          </a:p>
+        </p:txBody>
+      </p:sp>
+    </p:spTree>
+    <p:extLst>
+      <p:ext uri="{BB962C8B-B14F-4D97-AF65-F5344CB8AC3E}">
+        <p14:creationId xmlns:p14="http://schemas.microsoft.com/office/powerpoint/2010/main" val="4068707299"/>
+      </p:ext>
+    </p:extLst>
+  </p:cSld>
+  <p:clrMapOvr>
+    <a:masterClrMapping/>
+  </p:clrMapOvr>
+</p:sld>
+</file>
+
+<file path=ppt/slides/slide8.xml><?xml version="1.0" encoding="utf-8"?>
+<p:sld xmlns:a="http://schemas.openxmlformats.org/drawingml/2006/main" xmlns:r="http://schemas.openxmlformats.org/officeDocument/2006/relationships" xmlns:p="http://schemas.openxmlformats.org/presentationml/2006/main">
+  <p:cSld>
+    <p:spTree>
+      <p:nvGrpSpPr>
+        <p:cNvPr id="1" name=""/>
+        <p:cNvGrpSpPr/>
+        <p:nvPr/>
+      </p:nvGrpSpPr>
+      <p:grpSpPr>
+        <a:xfrm>
+          <a:off x="0" y="0"/>
+          <a:ext cx="0" cy="0"/>
+          <a:chOff x="0" y="0"/>
+          <a:chExt cx="0" cy="0"/>
+        </a:xfrm>
+      </p:grpSpPr>
+      <p:sp>
+        <p:nvSpPr>
+          <p:cNvPr id="2" name="Title 1"/>
+          <p:cNvSpPr>
+            <a:spLocks noGrp="1"/>
+          </p:cNvSpPr>
+          <p:nvPr>
+            <p:ph type="title"/>
+          </p:nvPr>
+        </p:nvSpPr>
+        <p:spPr/>
+        <p:txBody>
+          <a:bodyPr/>
+          <a:lstStyle/>
+          <a:p>
+            <a:r>
+              <a:rPr lang="en-US" dirty="0" smtClean="0"/>
               <a:t>We will look at the big-two…</a:t>
             </a:r>
             <a:endParaRPr lang="en-US" dirty="0"/>
@@ -4816,7 +5167,7 @@
 </p:sld>
 </file>
 
-<file path=ppt/slides/slide8.xml><?xml version="1.0" encoding="utf-8"?>
+<file path=ppt/slides/slide9.xml><?xml version="1.0" encoding="utf-8"?>
 <p:sld xmlns:a="http://schemas.openxmlformats.org/drawingml/2006/main" xmlns:r="http://schemas.openxmlformats.org/officeDocument/2006/relationships" xmlns:p="http://schemas.openxmlformats.org/presentationml/2006/main">
   <p:cSld>
     <p:spTree>
@@ -4997,127 +5348,6 @@
     <p:extLst>
       <p:ext uri="{BB962C8B-B14F-4D97-AF65-F5344CB8AC3E}">
         <p14:creationId xmlns:p14="http://schemas.microsoft.com/office/powerpoint/2010/main" val="2567703407"/>
-      </p:ext>
-    </p:extLst>
-  </p:cSld>
-  <p:clrMapOvr>
-    <a:masterClrMapping/>
-  </p:clrMapOvr>
-</p:sld>
-</file>
-
-<file path=ppt/slides/slide9.xml><?xml version="1.0" encoding="utf-8"?>
-<p:sld xmlns:a="http://schemas.openxmlformats.org/drawingml/2006/main" xmlns:r="http://schemas.openxmlformats.org/officeDocument/2006/relationships" xmlns:p="http://schemas.openxmlformats.org/presentationml/2006/main">
-  <p:cSld>
-    <p:spTree>
-      <p:nvGrpSpPr>
-        <p:cNvPr id="1" name=""/>
-        <p:cNvGrpSpPr/>
-        <p:nvPr/>
-      </p:nvGrpSpPr>
-      <p:grpSpPr>
-        <a:xfrm>
-          <a:off x="0" y="0"/>
-          <a:ext cx="0" cy="0"/>
-          <a:chOff x="0" y="0"/>
-          <a:chExt cx="0" cy="0"/>
-        </a:xfrm>
-      </p:grpSpPr>
-      <p:sp>
-        <p:nvSpPr>
-          <p:cNvPr id="2" name="Title 1"/>
-          <p:cNvSpPr>
-            <a:spLocks noGrp="1"/>
-          </p:cNvSpPr>
-          <p:nvPr>
-            <p:ph type="title"/>
-          </p:nvPr>
-        </p:nvSpPr>
-        <p:spPr/>
-        <p:txBody>
-          <a:bodyPr/>
-          <a:lstStyle/>
-          <a:p>
-            <a:r>
-              <a:rPr lang="en-US" dirty="0" smtClean="0"/>
-              <a:t>What we will examine in each</a:t>
-            </a:r>
-            <a:endParaRPr lang="en-US" dirty="0"/>
-          </a:p>
-        </p:txBody>
-      </p:sp>
-      <p:sp>
-        <p:nvSpPr>
-          <p:cNvPr id="3" name="Content Placeholder 2"/>
-          <p:cNvSpPr>
-            <a:spLocks noGrp="1"/>
-          </p:cNvSpPr>
-          <p:nvPr>
-            <p:ph idx="1"/>
-          </p:nvPr>
-        </p:nvSpPr>
-        <p:spPr>
-          <a:xfrm>
-            <a:off x="628650" y="1825625"/>
-            <a:ext cx="7886700" cy="3306212"/>
-          </a:xfrm>
-        </p:spPr>
-        <p:txBody>
-          <a:bodyPr>
-            <a:normAutofit lnSpcReduction="10000"/>
-          </a:bodyPr>
-          <a:lstStyle/>
-          <a:p>
-            <a:r>
-              <a:rPr lang="en-US" dirty="0" smtClean="0"/>
-              <a:t>Some history and theory</a:t>
-            </a:r>
-          </a:p>
-          <a:p>
-            <a:r>
-              <a:rPr lang="en-US" dirty="0" smtClean="0"/>
-              <a:t>Primarily database-first</a:t>
-            </a:r>
-          </a:p>
-          <a:p>
-            <a:r>
-              <a:rPr lang="en-US" dirty="0" smtClean="0"/>
-              <a:t>How code-first can be used to create a database</a:t>
-            </a:r>
-          </a:p>
-          <a:p>
-            <a:r>
-              <a:rPr lang="en-US" dirty="0" smtClean="0"/>
-              <a:t>How to map basic entities into database constructs</a:t>
-            </a:r>
-          </a:p>
-          <a:p>
-            <a:r>
-              <a:rPr lang="en-US" dirty="0" smtClean="0"/>
-              <a:t>CRUD operations on classes</a:t>
-            </a:r>
-          </a:p>
-          <a:p>
-            <a:r>
-              <a:rPr lang="en-US" dirty="0" smtClean="0"/>
-              <a:t>Navigating relationships</a:t>
-            </a:r>
-          </a:p>
-          <a:p>
-            <a:r>
-              <a:rPr lang="en-US" dirty="0" smtClean="0"/>
-              <a:t>Lazy and eager loading</a:t>
-            </a:r>
-          </a:p>
-          <a:p>
-            <a:endParaRPr lang="en-US" dirty="0"/>
-          </a:p>
-        </p:txBody>
-      </p:sp>
-    </p:spTree>
-    <p:extLst>
-      <p:ext uri="{BB962C8B-B14F-4D97-AF65-F5344CB8AC3E}">
-        <p14:creationId xmlns:p14="http://schemas.microsoft.com/office/powerpoint/2010/main" val="2626820673"/>
       </p:ext>
     </p:extLst>
   </p:cSld>

</xml_diff>